<commit_message>
Corrected typo in equation
</commit_message>
<xml_diff>
--- a/SupplementaryMaterial/ConditionalProbability_WhenOneThingDependsOnAother.pptx
+++ b/SupplementaryMaterial/ConditionalProbability_WhenOneThingDependsOnAother.pptx
@@ -15435,7 +15435,7 @@
             </p:spPr>
             <p:txBody>
               <a:bodyPr>
-                <a:normAutofit fontScale="85000" lnSpcReduction="20000"/>
+                <a:normAutofit fontScale="85000" lnSpcReduction="10000"/>
               </a:bodyPr>
               <a:lstStyle/>
               <a:p>
@@ -15643,10 +15643,10 @@
                             </m:num>
                             <m:den>
                               <m:r>
-                                <a:rPr lang="ar-AE">
+                                <a:rPr lang="en-US" b="0" i="1" smtClean="0">
                                   <a:latin typeface="Cambria Math" panose="02040503050406030204" pitchFamily="18" charset="0"/>
                                 </a:rPr>
-                                <m:t>𝑦</m:t>
+                                <m:t>𝑘</m:t>
                               </m:r>
                             </m:den>
                           </m:f>
@@ -16035,7 +16035,7 @@
               <a:blipFill>
                 <a:blip r:embed="rId2"/>
                 <a:stretch>
-                  <a:fillRect l="-741" t="-2447" r="-1259"/>
+                  <a:fillRect l="-741" t="-1794" r="-1259" b="-1142"/>
                 </a:stretch>
               </a:blipFill>
             </p:spPr>
@@ -16101,343 +16101,6 @@
   <p:clrMapOvr>
     <a:masterClrMapping/>
   </p:clrMapOvr>
-  <p:timing>
-    <p:tnLst>
-      <p:par>
-        <p:cTn id="1" dur="indefinite" restart="never" nodeType="tmRoot">
-          <p:childTnLst>
-            <p:seq concurrent="1" nextAc="seek">
-              <p:cTn id="2" dur="indefinite" nodeType="mainSeq">
-                <p:childTnLst>
-                  <p:par>
-                    <p:cTn id="3" fill="hold">
-                      <p:stCondLst>
-                        <p:cond delay="indefinite"/>
-                      </p:stCondLst>
-                      <p:childTnLst>
-                        <p:par>
-                          <p:cTn id="4" fill="hold">
-                            <p:stCondLst>
-                              <p:cond delay="0"/>
-                            </p:stCondLst>
-                            <p:childTnLst>
-                              <p:par>
-                                <p:cTn id="5" presetID="1" presetClass="entr" presetSubtype="0" fill="hold" nodeType="clickEffect">
-                                  <p:stCondLst>
-                                    <p:cond delay="0"/>
-                                  </p:stCondLst>
-                                  <p:childTnLst>
-                                    <p:set>
-                                      <p:cBhvr>
-                                        <p:cTn id="6" dur="1" fill="hold">
-                                          <p:stCondLst>
-                                            <p:cond delay="0"/>
-                                          </p:stCondLst>
-                                        </p:cTn>
-                                        <p:tgtEl>
-                                          <p:spTgt spid="3">
-                                            <p:txEl>
-                                              <p:pRg st="1" end="1"/>
-                                            </p:txEl>
-                                          </p:spTgt>
-                                        </p:tgtEl>
-                                        <p:attrNameLst>
-                                          <p:attrName>style.visibility</p:attrName>
-                                        </p:attrNameLst>
-                                      </p:cBhvr>
-                                      <p:to>
-                                        <p:strVal val="visible"/>
-                                      </p:to>
-                                    </p:set>
-                                  </p:childTnLst>
-                                </p:cTn>
-                              </p:par>
-                            </p:childTnLst>
-                          </p:cTn>
-                        </p:par>
-                      </p:childTnLst>
-                    </p:cTn>
-                  </p:par>
-                  <p:par>
-                    <p:cTn id="7" fill="hold">
-                      <p:stCondLst>
-                        <p:cond delay="indefinite"/>
-                      </p:stCondLst>
-                      <p:childTnLst>
-                        <p:par>
-                          <p:cTn id="8" fill="hold">
-                            <p:stCondLst>
-                              <p:cond delay="0"/>
-                            </p:stCondLst>
-                            <p:childTnLst>
-                              <p:par>
-                                <p:cTn id="9" presetID="1" presetClass="entr" presetSubtype="0" fill="hold" nodeType="clickEffect">
-                                  <p:stCondLst>
-                                    <p:cond delay="0"/>
-                                  </p:stCondLst>
-                                  <p:childTnLst>
-                                    <p:set>
-                                      <p:cBhvr>
-                                        <p:cTn id="10" dur="1" fill="hold">
-                                          <p:stCondLst>
-                                            <p:cond delay="0"/>
-                                          </p:stCondLst>
-                                        </p:cTn>
-                                        <p:tgtEl>
-                                          <p:spTgt spid="3">
-                                            <p:txEl>
-                                              <p:pRg st="2" end="2"/>
-                                            </p:txEl>
-                                          </p:spTgt>
-                                        </p:tgtEl>
-                                        <p:attrNameLst>
-                                          <p:attrName>style.visibility</p:attrName>
-                                        </p:attrNameLst>
-                                      </p:cBhvr>
-                                      <p:to>
-                                        <p:strVal val="visible"/>
-                                      </p:to>
-                                    </p:set>
-                                  </p:childTnLst>
-                                </p:cTn>
-                              </p:par>
-                            </p:childTnLst>
-                          </p:cTn>
-                        </p:par>
-                      </p:childTnLst>
-                    </p:cTn>
-                  </p:par>
-                  <p:par>
-                    <p:cTn id="11" fill="hold">
-                      <p:stCondLst>
-                        <p:cond delay="indefinite"/>
-                      </p:stCondLst>
-                      <p:childTnLst>
-                        <p:par>
-                          <p:cTn id="12" fill="hold">
-                            <p:stCondLst>
-                              <p:cond delay="0"/>
-                            </p:stCondLst>
-                            <p:childTnLst>
-                              <p:par>
-                                <p:cTn id="13" presetID="1" presetClass="entr" presetSubtype="0" fill="hold" nodeType="clickEffect">
-                                  <p:stCondLst>
-                                    <p:cond delay="0"/>
-                                  </p:stCondLst>
-                                  <p:childTnLst>
-                                    <p:set>
-                                      <p:cBhvr>
-                                        <p:cTn id="14" dur="1" fill="hold">
-                                          <p:stCondLst>
-                                            <p:cond delay="0"/>
-                                          </p:stCondLst>
-                                        </p:cTn>
-                                        <p:tgtEl>
-                                          <p:spTgt spid="3">
-                                            <p:txEl>
-                                              <p:pRg st="3" end="3"/>
-                                            </p:txEl>
-                                          </p:spTgt>
-                                        </p:tgtEl>
-                                        <p:attrNameLst>
-                                          <p:attrName>style.visibility</p:attrName>
-                                        </p:attrNameLst>
-                                      </p:cBhvr>
-                                      <p:to>
-                                        <p:strVal val="visible"/>
-                                      </p:to>
-                                    </p:set>
-                                  </p:childTnLst>
-                                </p:cTn>
-                              </p:par>
-                              <p:par>
-                                <p:cTn id="15" presetID="1" presetClass="entr" presetSubtype="0" fill="hold" nodeType="withEffect">
-                                  <p:stCondLst>
-                                    <p:cond delay="0"/>
-                                  </p:stCondLst>
-                                  <p:childTnLst>
-                                    <p:set>
-                                      <p:cBhvr>
-                                        <p:cTn id="16" dur="1" fill="hold">
-                                          <p:stCondLst>
-                                            <p:cond delay="0"/>
-                                          </p:stCondLst>
-                                        </p:cTn>
-                                        <p:tgtEl>
-                                          <p:spTgt spid="3">
-                                            <p:txEl>
-                                              <p:pRg st="4" end="4"/>
-                                            </p:txEl>
-                                          </p:spTgt>
-                                        </p:tgtEl>
-                                        <p:attrNameLst>
-                                          <p:attrName>style.visibility</p:attrName>
-                                        </p:attrNameLst>
-                                      </p:cBhvr>
-                                      <p:to>
-                                        <p:strVal val="visible"/>
-                                      </p:to>
-                                    </p:set>
-                                  </p:childTnLst>
-                                </p:cTn>
-                              </p:par>
-                            </p:childTnLst>
-                          </p:cTn>
-                        </p:par>
-                      </p:childTnLst>
-                    </p:cTn>
-                  </p:par>
-                  <p:par>
-                    <p:cTn id="17" fill="hold">
-                      <p:stCondLst>
-                        <p:cond delay="indefinite"/>
-                      </p:stCondLst>
-                      <p:childTnLst>
-                        <p:par>
-                          <p:cTn id="18" fill="hold">
-                            <p:stCondLst>
-                              <p:cond delay="0"/>
-                            </p:stCondLst>
-                            <p:childTnLst>
-                              <p:par>
-                                <p:cTn id="19" presetID="1" presetClass="entr" presetSubtype="0" fill="hold" nodeType="clickEffect">
-                                  <p:stCondLst>
-                                    <p:cond delay="0"/>
-                                  </p:stCondLst>
-                                  <p:childTnLst>
-                                    <p:set>
-                                      <p:cBhvr>
-                                        <p:cTn id="20" dur="1" fill="hold">
-                                          <p:stCondLst>
-                                            <p:cond delay="0"/>
-                                          </p:stCondLst>
-                                        </p:cTn>
-                                        <p:tgtEl>
-                                          <p:spTgt spid="3">
-                                            <p:txEl>
-                                              <p:pRg st="5" end="5"/>
-                                            </p:txEl>
-                                          </p:spTgt>
-                                        </p:tgtEl>
-                                        <p:attrNameLst>
-                                          <p:attrName>style.visibility</p:attrName>
-                                        </p:attrNameLst>
-                                      </p:cBhvr>
-                                      <p:to>
-                                        <p:strVal val="visible"/>
-                                      </p:to>
-                                    </p:set>
-                                  </p:childTnLst>
-                                </p:cTn>
-                              </p:par>
-                              <p:par>
-                                <p:cTn id="21" presetID="1" presetClass="entr" presetSubtype="0" fill="hold" nodeType="withEffect">
-                                  <p:stCondLst>
-                                    <p:cond delay="0"/>
-                                  </p:stCondLst>
-                                  <p:childTnLst>
-                                    <p:set>
-                                      <p:cBhvr>
-                                        <p:cTn id="22" dur="1" fill="hold">
-                                          <p:stCondLst>
-                                            <p:cond delay="0"/>
-                                          </p:stCondLst>
-                                        </p:cTn>
-                                        <p:tgtEl>
-                                          <p:spTgt spid="3">
-                                            <p:txEl>
-                                              <p:pRg st="6" end="6"/>
-                                            </p:txEl>
-                                          </p:spTgt>
-                                        </p:tgtEl>
-                                        <p:attrNameLst>
-                                          <p:attrName>style.visibility</p:attrName>
-                                        </p:attrNameLst>
-                                      </p:cBhvr>
-                                      <p:to>
-                                        <p:strVal val="visible"/>
-                                      </p:to>
-                                    </p:set>
-                                  </p:childTnLst>
-                                </p:cTn>
-                              </p:par>
-                            </p:childTnLst>
-                          </p:cTn>
-                        </p:par>
-                      </p:childTnLst>
-                    </p:cTn>
-                  </p:par>
-                  <p:par>
-                    <p:cTn id="23" fill="hold">
-                      <p:stCondLst>
-                        <p:cond delay="indefinite"/>
-                      </p:stCondLst>
-                      <p:childTnLst>
-                        <p:par>
-                          <p:cTn id="24" fill="hold">
-                            <p:stCondLst>
-                              <p:cond delay="0"/>
-                            </p:stCondLst>
-                            <p:childTnLst>
-                              <p:par>
-                                <p:cTn id="25" presetID="1" presetClass="entr" presetSubtype="0" fill="hold" nodeType="clickEffect">
-                                  <p:stCondLst>
-                                    <p:cond delay="0"/>
-                                  </p:stCondLst>
-                                  <p:childTnLst>
-                                    <p:set>
-                                      <p:cBhvr>
-                                        <p:cTn id="26" dur="1" fill="hold">
-                                          <p:stCondLst>
-                                            <p:cond delay="0"/>
-                                          </p:stCondLst>
-                                        </p:cTn>
-                                        <p:tgtEl>
-                                          <p:spTgt spid="3">
-                                            <p:txEl>
-                                              <p:pRg st="7" end="7"/>
-                                            </p:txEl>
-                                          </p:spTgt>
-                                        </p:tgtEl>
-                                        <p:attrNameLst>
-                                          <p:attrName>style.visibility</p:attrName>
-                                        </p:attrNameLst>
-                                      </p:cBhvr>
-                                      <p:to>
-                                        <p:strVal val="visible"/>
-                                      </p:to>
-                                    </p:set>
-                                  </p:childTnLst>
-                                </p:cTn>
-                              </p:par>
-                            </p:childTnLst>
-                          </p:cTn>
-                        </p:par>
-                      </p:childTnLst>
-                    </p:cTn>
-                  </p:par>
-                </p:childTnLst>
-              </p:cTn>
-              <p:prevCondLst>
-                <p:cond evt="onPrev" delay="0">
-                  <p:tgtEl>
-                    <p:sldTgt/>
-                  </p:tgtEl>
-                </p:cond>
-              </p:prevCondLst>
-              <p:nextCondLst>
-                <p:cond evt="onNext" delay="0">
-                  <p:tgtEl>
-                    <p:sldTgt/>
-                  </p:tgtEl>
-                </p:cond>
-              </p:nextCondLst>
-            </p:seq>
-          </p:childTnLst>
-        </p:cTn>
-      </p:par>
-    </p:tnLst>
-  </p:timing>
 </p:sld>
 </file>
 

</xml_diff>